<commit_message>
Adicionadas partes sobre a implementação. Falta slides sobre o resultado.
</commit_message>
<xml_diff>
--- a/apresentacao.pptx
+++ b/apresentacao.pptx
@@ -9,7 +9,10 @@
     <p:sldId id="257" r:id="rId3"/>
     <p:sldId id="258" r:id="rId4"/>
     <p:sldId id="259" r:id="rId5"/>
-    <p:sldId id="260" r:id="rId6"/>
+    <p:sldId id="261" r:id="rId6"/>
+    <p:sldId id="262" r:id="rId7"/>
+    <p:sldId id="263" r:id="rId8"/>
+    <p:sldId id="260" r:id="rId9"/>
   </p:sldIdLst>
   <p:sldSz cx="9144000" cy="6858000" type="screen4x3"/>
   <p:notesSz cx="6858000" cy="9144000"/>
@@ -4077,10 +4080,34 @@
         </p:nvSpPr>
         <p:spPr/>
         <p:txBody>
-          <a:bodyPr/>
-          <a:lstStyle/>
-          <a:p>
-            <a:endParaRPr lang="pt-BR"/>
+          <a:bodyPr anchor="ctr"/>
+          <a:lstStyle/>
+          <a:p>
+            <a:pPr marL="0" indent="0" algn="just">
+              <a:lnSpc>
+                <a:spcPct val="200000"/>
+              </a:lnSpc>
+              <a:buNone/>
+            </a:pPr>
+            <a:r>
+              <a:rPr lang="pt-BR" dirty="0" smtClean="0"/>
+              <a:t>Foi desenvolvida </a:t>
+            </a:r>
+            <a:r>
+              <a:rPr lang="pt-BR" dirty="0" smtClean="0"/>
+              <a:t>uma biblioteca para manipular grafos, </a:t>
+            </a:r>
+            <a:r>
+              <a:rPr lang="pt-BR" dirty="0" smtClean="0"/>
+              <a:t>que seja </a:t>
+            </a:r>
+            <a:r>
+              <a:rPr lang="pt-BR" dirty="0" smtClean="0"/>
+              <a:t>capaz de representá-los, assim como desenvolver um conjunto de algoritmos em grafos. A biblioteca foi desenvolvida de forma que possa ser utilizada por outros programas.</a:t>
+            </a:r>
+          </a:p>
+          <a:p>
+            <a:endParaRPr lang="pt-BR" dirty="0"/>
           </a:p>
         </p:txBody>
       </p:sp>
@@ -4144,10 +4171,114 @@
         </p:nvSpPr>
         <p:spPr/>
         <p:txBody>
-          <a:bodyPr/>
-          <a:lstStyle/>
-          <a:p>
-            <a:endParaRPr lang="pt-BR"/>
+          <a:bodyPr anchor="ctr"/>
+          <a:lstStyle/>
+          <a:p>
+            <a:pPr>
+              <a:lnSpc>
+                <a:spcPct val="200000"/>
+              </a:lnSpc>
+            </a:pPr>
+            <a:r>
+              <a:rPr lang="pt-BR" dirty="0" smtClean="0"/>
+              <a:t>Linguagem utilizada: C++</a:t>
+            </a:r>
+            <a:endParaRPr lang="pt-BR" dirty="0" smtClean="0"/>
+          </a:p>
+          <a:p>
+            <a:pPr>
+              <a:lnSpc>
+                <a:spcPct val="200000"/>
+              </a:lnSpc>
+            </a:pPr>
+            <a:r>
+              <a:rPr lang="pt-BR" dirty="0" smtClean="0"/>
+              <a:t>Orientação a objeto</a:t>
+            </a:r>
+          </a:p>
+          <a:p>
+            <a:pPr>
+              <a:lnSpc>
+                <a:spcPct val="200000"/>
+              </a:lnSpc>
+            </a:pPr>
+            <a:r>
+              <a:rPr lang="pt-BR" dirty="0" smtClean="0"/>
+              <a:t>Classe </a:t>
+            </a:r>
+            <a:r>
+              <a:rPr lang="pt-BR" dirty="0" err="1" smtClean="0">
+                <a:latin typeface="Courier New" pitchFamily="49" charset="0"/>
+                <a:cs typeface="Courier New" pitchFamily="49" charset="0"/>
+              </a:rPr>
+              <a:t>Graph</a:t>
+            </a:r>
+            <a:r>
+              <a:rPr lang="pt-BR" dirty="0" smtClean="0">
+                <a:cs typeface="Courier New" pitchFamily="49" charset="0"/>
+              </a:rPr>
+              <a:t> descreve o grafo</a:t>
+            </a:r>
+          </a:p>
+          <a:p>
+            <a:pPr lvl="1">
+              <a:lnSpc>
+                <a:spcPct val="200000"/>
+              </a:lnSpc>
+            </a:pPr>
+            <a:r>
+              <a:rPr lang="pt-BR" dirty="0" smtClean="0">
+                <a:cs typeface="Courier New" pitchFamily="49" charset="0"/>
+              </a:rPr>
+              <a:t>Classe </a:t>
+            </a:r>
+            <a:r>
+              <a:rPr lang="pt-BR" dirty="0" err="1" smtClean="0">
+                <a:latin typeface="Courier New" pitchFamily="49" charset="0"/>
+                <a:cs typeface="Courier New" pitchFamily="49" charset="0"/>
+              </a:rPr>
+              <a:t>Edge</a:t>
+            </a:r>
+            <a:r>
+              <a:rPr lang="pt-BR" dirty="0" smtClean="0">
+                <a:cs typeface="Courier New" pitchFamily="49" charset="0"/>
+              </a:rPr>
+              <a:t> - arestas</a:t>
+            </a:r>
+            <a:endParaRPr lang="pt-BR" dirty="0" smtClean="0">
+              <a:latin typeface="Courier New" pitchFamily="49" charset="0"/>
+              <a:cs typeface="Courier New" pitchFamily="49" charset="0"/>
+            </a:endParaRPr>
+          </a:p>
+          <a:p>
+            <a:pPr lvl="1">
+              <a:lnSpc>
+                <a:spcPct val="200000"/>
+              </a:lnSpc>
+            </a:pPr>
+            <a:r>
+              <a:rPr lang="pt-BR" dirty="0" smtClean="0">
+                <a:cs typeface="Courier New" pitchFamily="49" charset="0"/>
+              </a:rPr>
+              <a:t>Classe </a:t>
+            </a:r>
+            <a:r>
+              <a:rPr lang="pt-BR" dirty="0" err="1" smtClean="0">
+                <a:latin typeface="Courier New" pitchFamily="49" charset="0"/>
+                <a:cs typeface="Courier New" pitchFamily="49" charset="0"/>
+              </a:rPr>
+              <a:t>Node</a:t>
+            </a:r>
+            <a:r>
+              <a:rPr lang="pt-BR" dirty="0" smtClean="0">
+                <a:cs typeface="Courier New" pitchFamily="49" charset="0"/>
+              </a:rPr>
+              <a:t> - vértices</a:t>
+            </a:r>
+            <a:endParaRPr lang="pt-BR" dirty="0" smtClean="0">
+              <a:latin typeface="Courier New" pitchFamily="49" charset="0"/>
+              <a:cs typeface="Courier New" pitchFamily="49" charset="0"/>
+            </a:endParaRPr>
           </a:p>
         </p:txBody>
       </p:sp>
@@ -4192,10 +4323,403 @@
           <a:lstStyle/>
           <a:p>
             <a:r>
-              <a:rPr lang="pt-BR" smtClean="0"/>
+              <a:rPr lang="pt-BR" dirty="0" smtClean="0"/>
+              <a:t>Implementação - UML</a:t>
+            </a:r>
+            <a:endParaRPr lang="pt-BR" dirty="0"/>
+          </a:p>
+        </p:txBody>
+      </p:sp>
+      <p:pic>
+        <p:nvPicPr>
+          <p:cNvPr id="1028" name="Picture 4"/>
+          <p:cNvPicPr>
+            <a:picLocks noGrp="1" noChangeAspect="1" noChangeArrowheads="1"/>
+          </p:cNvPicPr>
+          <p:nvPr>
+            <p:ph idx="1"/>
+          </p:nvPr>
+        </p:nvPicPr>
+        <p:blipFill>
+          <a:blip r:embed="rId2" cstate="print"/>
+          <a:srcRect/>
+          <a:stretch>
+            <a:fillRect/>
+          </a:stretch>
+        </p:blipFill>
+        <p:spPr bwMode="auto">
+          <a:xfrm>
+            <a:off x="683568" y="2348880"/>
+            <a:ext cx="7692149" cy="3269163"/>
+          </a:xfrm>
+          <a:prstGeom prst="rect">
+            <a:avLst/>
+          </a:prstGeom>
+          <a:noFill/>
+          <a:ln w="9525">
+            <a:noFill/>
+            <a:miter lim="800000"/>
+            <a:headEnd/>
+            <a:tailEnd/>
+          </a:ln>
+        </p:spPr>
+      </p:pic>
+    </p:spTree>
+  </p:cSld>
+  <p:clrMapOvr>
+    <a:masterClrMapping/>
+  </p:clrMapOvr>
+</p:sld>
+</file>
+
+<file path=ppt/slides/slide6.xml><?xml version="1.0" encoding="utf-8"?>
+<p:sld xmlns:a="http://schemas.openxmlformats.org/drawingml/2006/main" xmlns:r="http://schemas.openxmlformats.org/officeDocument/2006/relationships" xmlns:p="http://schemas.openxmlformats.org/presentationml/2006/main">
+  <p:cSld>
+    <p:spTree>
+      <p:nvGrpSpPr>
+        <p:cNvPr id="1" name=""/>
+        <p:cNvGrpSpPr/>
+        <p:nvPr/>
+      </p:nvGrpSpPr>
+      <p:grpSpPr>
+        <a:xfrm>
+          <a:off x="0" y="0"/>
+          <a:ext cx="0" cy="0"/>
+          <a:chOff x="0" y="0"/>
+          <a:chExt cx="0" cy="0"/>
+        </a:xfrm>
+      </p:grpSpPr>
+      <p:sp>
+        <p:nvSpPr>
+          <p:cNvPr id="2" name="Título 1"/>
+          <p:cNvSpPr>
+            <a:spLocks noGrp="1"/>
+          </p:cNvSpPr>
+          <p:nvPr>
+            <p:ph type="title"/>
+          </p:nvPr>
+        </p:nvSpPr>
+        <p:spPr/>
+        <p:txBody>
+          <a:bodyPr/>
+          <a:lstStyle/>
+          <a:p>
+            <a:r>
+              <a:rPr lang="pt-BR" dirty="0" smtClean="0"/>
+              <a:t>Vetor x </a:t>
+            </a:r>
+            <a:r>
+              <a:rPr lang="pt-BR" dirty="0" err="1" smtClean="0"/>
+              <a:t>array</a:t>
+            </a:r>
+            <a:endParaRPr lang="pt-BR" dirty="0"/>
+          </a:p>
+        </p:txBody>
+      </p:sp>
+      <p:sp>
+        <p:nvSpPr>
+          <p:cNvPr id="3" name="Espaço Reservado para Conteúdo 2"/>
+          <p:cNvSpPr>
+            <a:spLocks noGrp="1"/>
+          </p:cNvSpPr>
+          <p:nvPr>
+            <p:ph idx="1"/>
+          </p:nvPr>
+        </p:nvSpPr>
+        <p:spPr/>
+        <p:txBody>
+          <a:bodyPr anchor="ctr"/>
+          <a:lstStyle/>
+          <a:p>
+            <a:pPr marL="0" indent="0" algn="just">
+              <a:lnSpc>
+                <a:spcPct val="200000"/>
+              </a:lnSpc>
+              <a:buNone/>
+            </a:pPr>
+            <a:r>
+              <a:rPr lang="pt-BR" dirty="0" smtClean="0"/>
+              <a:t>O uso do </a:t>
+            </a:r>
+            <a:r>
+              <a:rPr lang="pt-BR" i="1" dirty="0" smtClean="0"/>
+              <a:t>container </a:t>
+            </a:r>
+            <a:r>
+              <a:rPr lang="pt-BR" dirty="0" err="1" smtClean="0">
+                <a:latin typeface="Courier New" pitchFamily="49" charset="0"/>
+                <a:cs typeface="Courier New" pitchFamily="49" charset="0"/>
+              </a:rPr>
+              <a:t>vector</a:t>
+            </a:r>
+            <a:r>
+              <a:rPr lang="pt-BR" dirty="0" smtClean="0"/>
+              <a:t> possibilita uma alocação dinâmica de memória para o </a:t>
+            </a:r>
+            <a:r>
+              <a:rPr lang="pt-BR" i="1" dirty="0" err="1" smtClean="0"/>
+              <a:t>array</a:t>
+            </a:r>
+            <a:r>
+              <a:rPr lang="pt-BR" dirty="0" smtClean="0"/>
+              <a:t>, permitindo expandi-lo ou contraí-lo quando necessário de modo prático – usando a função </a:t>
+            </a:r>
+            <a:r>
+              <a:rPr lang="pt-BR" dirty="0" err="1" smtClean="0">
+                <a:latin typeface="Courier New" pitchFamily="49" charset="0"/>
+                <a:cs typeface="Courier New" pitchFamily="49" charset="0"/>
+              </a:rPr>
+              <a:t>resize</a:t>
+            </a:r>
+            <a:r>
+              <a:rPr lang="pt-BR" dirty="0" smtClean="0"/>
+              <a:t> ou simplesmente adicionando um elemento no seu fim (</a:t>
+            </a:r>
+            <a:r>
+              <a:rPr lang="pt-BR" dirty="0" err="1" smtClean="0">
+                <a:latin typeface="Courier New" pitchFamily="49" charset="0"/>
+                <a:cs typeface="Courier New" pitchFamily="49" charset="0"/>
+              </a:rPr>
+              <a:t>push_back</a:t>
+            </a:r>
+            <a:r>
+              <a:rPr lang="pt-BR" dirty="0" smtClean="0"/>
+              <a:t>).</a:t>
+            </a:r>
+          </a:p>
+          <a:p>
+            <a:endParaRPr lang="pt-BR" dirty="0"/>
+          </a:p>
+        </p:txBody>
+      </p:sp>
+    </p:spTree>
+  </p:cSld>
+  <p:clrMapOvr>
+    <a:masterClrMapping/>
+  </p:clrMapOvr>
+</p:sld>
+</file>
+
+<file path=ppt/slides/slide7.xml><?xml version="1.0" encoding="utf-8"?>
+<p:sld xmlns:a="http://schemas.openxmlformats.org/drawingml/2006/main" xmlns:r="http://schemas.openxmlformats.org/officeDocument/2006/relationships" xmlns:p="http://schemas.openxmlformats.org/presentationml/2006/main">
+  <p:cSld>
+    <p:spTree>
+      <p:nvGrpSpPr>
+        <p:cNvPr id="1" name=""/>
+        <p:cNvGrpSpPr/>
+        <p:nvPr/>
+      </p:nvGrpSpPr>
+      <p:grpSpPr>
+        <a:xfrm>
+          <a:off x="0" y="0"/>
+          <a:ext cx="0" cy="0"/>
+          <a:chOff x="0" y="0"/>
+          <a:chExt cx="0" cy="0"/>
+        </a:xfrm>
+      </p:grpSpPr>
+      <p:sp>
+        <p:nvSpPr>
+          <p:cNvPr id="2" name="Título 1"/>
+          <p:cNvSpPr>
+            <a:spLocks noGrp="1"/>
+          </p:cNvSpPr>
+          <p:nvPr>
+            <p:ph type="title"/>
+          </p:nvPr>
+        </p:nvSpPr>
+        <p:spPr/>
+        <p:txBody>
+          <a:bodyPr/>
+          <a:lstStyle/>
+          <a:p>
+            <a:r>
+              <a:rPr lang="pt-BR" dirty="0" smtClean="0"/>
+              <a:t>Tipo </a:t>
+            </a:r>
+            <a:r>
+              <a:rPr lang="pt-BR" dirty="0" err="1" smtClean="0"/>
+              <a:t>bool</a:t>
+            </a:r>
+            <a:r>
+              <a:rPr lang="pt-BR" dirty="0" smtClean="0"/>
+              <a:t> x vetor </a:t>
+            </a:r>
+            <a:r>
+              <a:rPr lang="pt-BR" dirty="0" err="1" smtClean="0"/>
+              <a:t>bool</a:t>
+            </a:r>
+            <a:endParaRPr lang="pt-BR" dirty="0"/>
+          </a:p>
+        </p:txBody>
+      </p:sp>
+      <p:sp>
+        <p:nvSpPr>
+          <p:cNvPr id="3" name="Espaço Reservado para Conteúdo 2"/>
+          <p:cNvSpPr>
+            <a:spLocks noGrp="1"/>
+          </p:cNvSpPr>
+          <p:nvPr>
+            <p:ph idx="1"/>
+          </p:nvPr>
+        </p:nvSpPr>
+        <p:spPr/>
+        <p:txBody>
+          <a:bodyPr>
+            <a:normAutofit fontScale="85000" lnSpcReduction="10000"/>
+          </a:bodyPr>
+          <a:lstStyle/>
+          <a:p>
+            <a:pPr algn="just">
+              <a:lnSpc>
+                <a:spcPct val="170000"/>
+              </a:lnSpc>
+            </a:pPr>
+            <a:endParaRPr lang="pt-BR" dirty="0" smtClean="0"/>
+          </a:p>
+          <a:p>
+            <a:pPr marL="0" indent="0" algn="just">
+              <a:lnSpc>
+                <a:spcPct val="170000"/>
+              </a:lnSpc>
+              <a:buNone/>
+              <a:tabLst>
+                <a:tab pos="180975" algn="l"/>
+              </a:tabLst>
+            </a:pPr>
+            <a:r>
+              <a:rPr lang="pt-BR" dirty="0" smtClean="0"/>
+              <a:t>É sabido que variáveis do tipo </a:t>
+            </a:r>
+            <a:r>
+              <a:rPr lang="pt-BR" dirty="0" err="1" smtClean="0"/>
+              <a:t>bool</a:t>
+            </a:r>
+            <a:r>
+              <a:rPr lang="pt-BR" dirty="0" smtClean="0"/>
+              <a:t> não ocupam somente um </a:t>
+            </a:r>
+            <a:r>
+              <a:rPr lang="pt-BR" i="1" dirty="0" smtClean="0"/>
+              <a:t>bit</a:t>
+            </a:r>
+            <a:r>
+              <a:rPr lang="pt-BR" dirty="0" smtClean="0"/>
+              <a:t> em memória, e sim um </a:t>
+            </a:r>
+            <a:r>
+              <a:rPr lang="pt-BR" i="1" dirty="0" smtClean="0"/>
+              <a:t>byte</a:t>
+            </a:r>
+            <a:r>
+              <a:rPr lang="pt-BR" dirty="0" smtClean="0"/>
+              <a:t> – por questões de endereçamento de memória. Entretanto, o </a:t>
+            </a:r>
+            <a:r>
+              <a:rPr lang="pt-BR" i="1" dirty="0" smtClean="0"/>
+              <a:t>container </a:t>
+            </a:r>
+            <a:r>
+              <a:rPr lang="pt-BR" dirty="0" err="1" smtClean="0">
+                <a:latin typeface="Courier New" pitchFamily="49" charset="0"/>
+                <a:cs typeface="Courier New" pitchFamily="49" charset="0"/>
+              </a:rPr>
+              <a:t>vector</a:t>
+            </a:r>
+            <a:r>
+              <a:rPr lang="pt-BR" dirty="0" smtClean="0">
+                <a:latin typeface="Courier New" pitchFamily="49" charset="0"/>
+                <a:cs typeface="Courier New" pitchFamily="49" charset="0"/>
+              </a:rPr>
+              <a:t>&lt;</a:t>
+            </a:r>
+            <a:r>
+              <a:rPr lang="pt-BR" dirty="0" err="1" smtClean="0">
+                <a:latin typeface="Courier New" pitchFamily="49" charset="0"/>
+                <a:cs typeface="Courier New" pitchFamily="49" charset="0"/>
+              </a:rPr>
+              <a:t>bool</a:t>
+            </a:r>
+            <a:r>
+              <a:rPr lang="pt-BR" dirty="0" smtClean="0">
+                <a:latin typeface="Courier New" pitchFamily="49" charset="0"/>
+                <a:cs typeface="Courier New" pitchFamily="49" charset="0"/>
+              </a:rPr>
+              <a:t>&gt;</a:t>
+            </a:r>
+            <a:r>
+              <a:rPr lang="pt-BR" dirty="0" smtClean="0"/>
+              <a:t>, uma especialização de </a:t>
+            </a:r>
+            <a:r>
+              <a:rPr lang="pt-BR" dirty="0" err="1" smtClean="0">
+                <a:latin typeface="Courier New" pitchFamily="49" charset="0"/>
+                <a:cs typeface="Courier New" pitchFamily="49" charset="0"/>
+              </a:rPr>
+              <a:t>vector</a:t>
+            </a:r>
+            <a:r>
+              <a:rPr lang="pt-BR" dirty="0" smtClean="0"/>
+              <a:t>, usa somente um bit para cada elemento, além de ter a possibilidade de ser referenciado usando os colchetes (“[ ]”), como num </a:t>
+            </a:r>
+            <a:r>
+              <a:rPr lang="pt-BR" i="1" dirty="0" err="1" smtClean="0"/>
+              <a:t>array</a:t>
+            </a:r>
+            <a:r>
+              <a:rPr lang="pt-BR" dirty="0" smtClean="0"/>
+              <a:t>.</a:t>
+            </a:r>
+          </a:p>
+          <a:p>
+            <a:endParaRPr lang="pt-BR" dirty="0"/>
+          </a:p>
+        </p:txBody>
+      </p:sp>
+    </p:spTree>
+  </p:cSld>
+  <p:clrMapOvr>
+    <a:masterClrMapping/>
+  </p:clrMapOvr>
+</p:sld>
+</file>
+
+<file path=ppt/slides/slide8.xml><?xml version="1.0" encoding="utf-8"?>
+<p:sld xmlns:a="http://schemas.openxmlformats.org/drawingml/2006/main" xmlns:r="http://schemas.openxmlformats.org/officeDocument/2006/relationships" xmlns:p="http://schemas.openxmlformats.org/presentationml/2006/main">
+  <p:cSld>
+    <p:spTree>
+      <p:nvGrpSpPr>
+        <p:cNvPr id="1" name=""/>
+        <p:cNvGrpSpPr/>
+        <p:nvPr/>
+      </p:nvGrpSpPr>
+      <p:grpSpPr>
+        <a:xfrm>
+          <a:off x="0" y="0"/>
+          <a:ext cx="0" cy="0"/>
+          <a:chOff x="0" y="0"/>
+          <a:chExt cx="0" cy="0"/>
+        </a:xfrm>
+      </p:grpSpPr>
+      <p:sp>
+        <p:nvSpPr>
+          <p:cNvPr id="2" name="Título 1"/>
+          <p:cNvSpPr>
+            <a:spLocks noGrp="1"/>
+          </p:cNvSpPr>
+          <p:nvPr>
+            <p:ph type="title"/>
+          </p:nvPr>
+        </p:nvSpPr>
+        <p:spPr/>
+        <p:txBody>
+          <a:bodyPr/>
+          <a:lstStyle/>
+          <a:p>
+            <a:r>
+              <a:rPr lang="pt-BR" dirty="0" smtClean="0"/>
               <a:t>Resultados</a:t>
             </a:r>
-            <a:endParaRPr lang="pt-BR"/>
+            <a:endParaRPr lang="pt-BR" dirty="0"/>
           </a:p>
         </p:txBody>
       </p:sp>

</xml_diff>

<commit_message>
Separadas estruturas AdjacencyList e AdjacencyMatrix. BFS na estrutura Graph OK.
</commit_message>
<xml_diff>
--- a/apresentacao.pptx
+++ b/apresentacao.pptx
@@ -4575,7 +4575,6 @@
               <a:rPr lang="pt-BR" dirty="0" smtClean="0"/>
               <a:t>Maior grau: 71 </a:t>
             </a:r>
-            <a:endParaRPr lang="pt-BR" dirty="0" smtClean="0"/>
           </a:p>
           <a:p>
             <a:pPr>
@@ -4749,11 +4748,7 @@
           <a:p>
             <a:r>
               <a:rPr lang="pt-BR" dirty="0" smtClean="0"/>
-              <a:t>Resultados – Grafo </a:t>
-            </a:r>
-            <a:r>
-              <a:rPr lang="pt-BR" dirty="0" smtClean="0"/>
-              <a:t>da Internet</a:t>
+              <a:t>Resultados – Grafo da Internet</a:t>
             </a:r>
             <a:endParaRPr lang="pt-BR" dirty="0"/>
           </a:p>
@@ -4850,11 +4845,7 @@
           <a:p>
             <a:r>
               <a:rPr lang="pt-BR" dirty="0" smtClean="0"/>
-              <a:t>Resultados – Grafo </a:t>
-            </a:r>
-            <a:r>
-              <a:rPr lang="pt-BR" dirty="0" smtClean="0"/>
-              <a:t>da Internet</a:t>
+              <a:t>Resultados – Grafo da Internet</a:t>
             </a:r>
             <a:endParaRPr lang="pt-BR" dirty="0"/>
           </a:p>
@@ -4895,7 +4886,6 @@
               <a:rPr lang="pt-BR" dirty="0" smtClean="0"/>
               <a:t>Maior grau: 2159</a:t>
             </a:r>
-            <a:endParaRPr lang="pt-BR" dirty="0" smtClean="0"/>
           </a:p>
           <a:p>
             <a:pPr>
@@ -6184,7 +6174,22 @@
           <a:p>
             <a:r>
               <a:rPr lang="pt-BR" dirty="0" smtClean="0"/>
-              <a:t>Diâmetro da Internet: 10</a:t>
+              <a:t>Diâmetro da Internet: </a:t>
+            </a:r>
+            <a:r>
+              <a:rPr lang="pt-BR" dirty="0" smtClean="0"/>
+              <a:t>11</a:t>
+            </a:r>
+            <a:br>
+              <a:rPr lang="pt-BR" dirty="0" smtClean="0"/>
+            </a:br>
+            <a:r>
+              <a:rPr lang="pt-BR" dirty="0" smtClean="0"/>
+              <a:t>(BFS a </a:t>
+            </a:r>
+            <a:r>
+              <a:rPr lang="pt-BR" smtClean="0"/>
+              <a:t>partir do vértice 12111)</a:t>
             </a:r>
             <a:endParaRPr lang="pt-BR" dirty="0"/>
           </a:p>

</xml_diff>